<commit_message>
updated slides and gitignore
</commit_message>
<xml_diff>
--- a/EDA.pptx
+++ b/EDA.pptx
@@ -5,7 +5,7 @@
     <p:sldMasterId id="2147483672" r:id="rId1"/>
   </p:sldMasterIdLst>
   <p:notesMasterIdLst>
-    <p:notesMasterId r:id="rId15"/>
+    <p:notesMasterId r:id="rId18"/>
   </p:notesMasterIdLst>
   <p:sldIdLst>
     <p:sldId id="580" r:id="rId2"/>
@@ -20,7 +20,10 @@
     <p:sldId id="584" r:id="rId11"/>
     <p:sldId id="583" r:id="rId12"/>
     <p:sldId id="585" r:id="rId13"/>
-    <p:sldId id="526" r:id="rId14"/>
+    <p:sldId id="596" r:id="rId14"/>
+    <p:sldId id="595" r:id="rId15"/>
+    <p:sldId id="597" r:id="rId16"/>
+    <p:sldId id="526" r:id="rId17"/>
   </p:sldIdLst>
   <p:sldSz cx="9144000" cy="6858000" type="screen4x3"/>
   <p:notesSz cx="6858000" cy="9144000"/>
@@ -209,7 +212,7 @@
           <a:p>
             <a:fld id="{CC1A4AAF-1B8A-4490-8E52-E5410A97C86B}" type="datetimeFigureOut">
               <a:rPr lang="en-US" smtClean="0"/>
-              <a:t>10/21/2019</a:t>
+              <a:t>10/26/2019</a:t>
             </a:fld>
             <a:endParaRPr lang="en-US"/>
           </a:p>
@@ -554,6 +557,324 @@
     <p:extLst>
       <p:ext uri="{BB962C8B-B14F-4D97-AF65-F5344CB8AC3E}">
         <p14:creationId xmlns:p14="http://schemas.microsoft.com/office/powerpoint/2010/main" val="3753640273"/>
+      </p:ext>
+    </p:extLst>
+  </p:cSld>
+  <p:clrMapOvr>
+    <a:masterClrMapping/>
+  </p:clrMapOvr>
+</p:notes>
+</file>
+
+<file path=ppt/notesSlides/notesSlide10.xml><?xml version="1.0" encoding="utf-8"?>
+<p:notes xmlns:a="http://schemas.openxmlformats.org/drawingml/2006/main" xmlns:r="http://schemas.openxmlformats.org/officeDocument/2006/relationships" xmlns:p="http://schemas.openxmlformats.org/presentationml/2006/main">
+  <p:cSld>
+    <p:spTree>
+      <p:nvGrpSpPr>
+        <p:cNvPr id="1" name=""/>
+        <p:cNvGrpSpPr/>
+        <p:nvPr/>
+      </p:nvGrpSpPr>
+      <p:grpSpPr>
+        <a:xfrm>
+          <a:off x="0" y="0"/>
+          <a:ext cx="0" cy="0"/>
+          <a:chOff x="0" y="0"/>
+          <a:chExt cx="0" cy="0"/>
+        </a:xfrm>
+      </p:grpSpPr>
+      <p:sp>
+        <p:nvSpPr>
+          <p:cNvPr id="2" name="Slide Image Placeholder 1"/>
+          <p:cNvSpPr>
+            <a:spLocks noGrp="1" noRot="1" noChangeAspect="1"/>
+          </p:cNvSpPr>
+          <p:nvPr>
+            <p:ph type="sldImg"/>
+          </p:nvPr>
+        </p:nvSpPr>
+        <p:spPr/>
+      </p:sp>
+      <p:sp>
+        <p:nvSpPr>
+          <p:cNvPr id="3" name="Notes Placeholder 2"/>
+          <p:cNvSpPr>
+            <a:spLocks noGrp="1"/>
+          </p:cNvSpPr>
+          <p:nvPr>
+            <p:ph type="body" idx="1"/>
+          </p:nvPr>
+        </p:nvSpPr>
+        <p:spPr/>
+        <p:txBody>
+          <a:bodyPr/>
+          <a:lstStyle/>
+          <a:p>
+            <a:r>
+              <a:rPr lang="en-US" dirty="0"/>
+              <a:t>66 @ Grand Rapids</a:t>
+            </a:r>
+          </a:p>
+          <a:p>
+            <a:endParaRPr lang="en-US" dirty="0"/>
+          </a:p>
+          <a:p>
+            <a:r>
+              <a:rPr lang="en-US" dirty="0"/>
+              <a:t>32 @ San Francisco</a:t>
+            </a:r>
+          </a:p>
+        </p:txBody>
+      </p:sp>
+      <p:sp>
+        <p:nvSpPr>
+          <p:cNvPr id="4" name="Slide Number Placeholder 3"/>
+          <p:cNvSpPr>
+            <a:spLocks noGrp="1"/>
+          </p:cNvSpPr>
+          <p:nvPr>
+            <p:ph type="sldNum" sz="quarter" idx="5"/>
+          </p:nvPr>
+        </p:nvSpPr>
+        <p:spPr/>
+        <p:txBody>
+          <a:bodyPr/>
+          <a:lstStyle/>
+          <a:p>
+            <a:fld id="{F0907D5C-EF64-4626-B9AD-A571C980C113}" type="slidenum">
+              <a:rPr lang="en-US" smtClean="0"/>
+              <a:t>13</a:t>
+            </a:fld>
+            <a:endParaRPr lang="en-US"/>
+          </a:p>
+        </p:txBody>
+      </p:sp>
+    </p:spTree>
+    <p:extLst>
+      <p:ext uri="{BB962C8B-B14F-4D97-AF65-F5344CB8AC3E}">
+        <p14:creationId xmlns:p14="http://schemas.microsoft.com/office/powerpoint/2010/main" val="2363389505"/>
+      </p:ext>
+    </p:extLst>
+  </p:cSld>
+  <p:clrMapOvr>
+    <a:masterClrMapping/>
+  </p:clrMapOvr>
+</p:notes>
+</file>
+
+<file path=ppt/notesSlides/notesSlide11.xml><?xml version="1.0" encoding="utf-8"?>
+<p:notes xmlns:a="http://schemas.openxmlformats.org/drawingml/2006/main" xmlns:r="http://schemas.openxmlformats.org/officeDocument/2006/relationships" xmlns:p="http://schemas.openxmlformats.org/presentationml/2006/main">
+  <p:cSld>
+    <p:spTree>
+      <p:nvGrpSpPr>
+        <p:cNvPr id="1" name=""/>
+        <p:cNvGrpSpPr/>
+        <p:nvPr/>
+      </p:nvGrpSpPr>
+      <p:grpSpPr>
+        <a:xfrm>
+          <a:off x="0" y="0"/>
+          <a:ext cx="0" cy="0"/>
+          <a:chOff x="0" y="0"/>
+          <a:chExt cx="0" cy="0"/>
+        </a:xfrm>
+      </p:grpSpPr>
+      <p:sp>
+        <p:nvSpPr>
+          <p:cNvPr id="2" name="Slide Image Placeholder 1"/>
+          <p:cNvSpPr>
+            <a:spLocks noGrp="1" noRot="1" noChangeAspect="1"/>
+          </p:cNvSpPr>
+          <p:nvPr>
+            <p:ph type="sldImg"/>
+          </p:nvPr>
+        </p:nvSpPr>
+        <p:spPr/>
+      </p:sp>
+      <p:sp>
+        <p:nvSpPr>
+          <p:cNvPr id="3" name="Notes Placeholder 2"/>
+          <p:cNvSpPr>
+            <a:spLocks noGrp="1"/>
+          </p:cNvSpPr>
+          <p:nvPr>
+            <p:ph type="body" idx="1"/>
+          </p:nvPr>
+        </p:nvSpPr>
+        <p:spPr/>
+        <p:txBody>
+          <a:bodyPr/>
+          <a:lstStyle/>
+          <a:p>
+            <a:r>
+              <a:rPr lang="en-US" dirty="0"/>
+              <a:t>Grand Rapids again with 62 unique beers coming out of Brewery Vivant</a:t>
+            </a:r>
+          </a:p>
+          <a:p>
+            <a:endParaRPr lang="en-US" dirty="0"/>
+          </a:p>
+          <a:p>
+            <a:r>
+              <a:rPr lang="en-US" dirty="0"/>
+              <a:t>Bonfire and Suntan trailing 9/10 at 19 each</a:t>
+            </a:r>
+          </a:p>
+          <a:p>
+            <a:endParaRPr lang="en-US" dirty="0"/>
+          </a:p>
+          <a:p>
+            <a:r>
+              <a:rPr lang="en-US" dirty="0"/>
+              <a:t>Colorado again, no surprise is high on the charts.</a:t>
+            </a:r>
+          </a:p>
+        </p:txBody>
+      </p:sp>
+      <p:sp>
+        <p:nvSpPr>
+          <p:cNvPr id="4" name="Slide Number Placeholder 3"/>
+          <p:cNvSpPr>
+            <a:spLocks noGrp="1"/>
+          </p:cNvSpPr>
+          <p:nvPr>
+            <p:ph type="sldNum" sz="quarter" idx="5"/>
+          </p:nvPr>
+        </p:nvSpPr>
+        <p:spPr/>
+        <p:txBody>
+          <a:bodyPr/>
+          <a:lstStyle/>
+          <a:p>
+            <a:fld id="{F0907D5C-EF64-4626-B9AD-A571C980C113}" type="slidenum">
+              <a:rPr lang="en-US" smtClean="0"/>
+              <a:t>14</a:t>
+            </a:fld>
+            <a:endParaRPr lang="en-US"/>
+          </a:p>
+        </p:txBody>
+      </p:sp>
+    </p:spTree>
+    <p:extLst>
+      <p:ext uri="{BB962C8B-B14F-4D97-AF65-F5344CB8AC3E}">
+        <p14:creationId xmlns:p14="http://schemas.microsoft.com/office/powerpoint/2010/main" val="2043418173"/>
+      </p:ext>
+    </p:extLst>
+  </p:cSld>
+  <p:clrMapOvr>
+    <a:masterClrMapping/>
+  </p:clrMapOvr>
+</p:notes>
+</file>
+
+<file path=ppt/notesSlides/notesSlide12.xml><?xml version="1.0" encoding="utf-8"?>
+<p:notes xmlns:a="http://schemas.openxmlformats.org/drawingml/2006/main" xmlns:r="http://schemas.openxmlformats.org/officeDocument/2006/relationships" xmlns:p="http://schemas.openxmlformats.org/presentationml/2006/main">
+  <p:cSld>
+    <p:spTree>
+      <p:nvGrpSpPr>
+        <p:cNvPr id="1" name=""/>
+        <p:cNvGrpSpPr/>
+        <p:nvPr/>
+      </p:nvGrpSpPr>
+      <p:grpSpPr>
+        <a:xfrm>
+          <a:off x="0" y="0"/>
+          <a:ext cx="0" cy="0"/>
+          <a:chOff x="0" y="0"/>
+          <a:chExt cx="0" cy="0"/>
+        </a:xfrm>
+      </p:grpSpPr>
+      <p:sp>
+        <p:nvSpPr>
+          <p:cNvPr id="2" name="Slide Image Placeholder 1"/>
+          <p:cNvSpPr>
+            <a:spLocks noGrp="1" noRot="1" noChangeAspect="1"/>
+          </p:cNvSpPr>
+          <p:nvPr>
+            <p:ph type="sldImg"/>
+          </p:nvPr>
+        </p:nvSpPr>
+        <p:spPr/>
+      </p:sp>
+      <p:sp>
+        <p:nvSpPr>
+          <p:cNvPr id="3" name="Notes Placeholder 2"/>
+          <p:cNvSpPr>
+            <a:spLocks noGrp="1"/>
+          </p:cNvSpPr>
+          <p:nvPr>
+            <p:ph type="body" idx="1"/>
+          </p:nvPr>
+        </p:nvSpPr>
+        <p:spPr/>
+        <p:txBody>
+          <a:bodyPr/>
+          <a:lstStyle/>
+          <a:p>
+            <a:r>
+              <a:rPr lang="en-US" dirty="0"/>
+              <a:t>Where the breweries are located throughout the united status</a:t>
+            </a:r>
+          </a:p>
+          <a:p>
+            <a:r>
+              <a:rPr lang="en-US" dirty="0"/>
+              <a:t>Highlighted some notable beers using ABV and IBU in our trend analysis</a:t>
+            </a:r>
+          </a:p>
+          <a:p>
+            <a:r>
+              <a:rPr lang="en-US" dirty="0"/>
+              <a:t>How IBU and ABV are related, they are in fact correlated</a:t>
+            </a:r>
+          </a:p>
+          <a:p>
+            <a:r>
+              <a:rPr lang="en-US" dirty="0"/>
+              <a:t>No slide for it, but we actually build a Machine Learning classification algorithm which comes in just under 80% accurate at predicting if a beer is an IPA or not just using the ABV and IBU values.</a:t>
+            </a:r>
+          </a:p>
+          <a:p>
+            <a:r>
+              <a:rPr lang="en-US" dirty="0"/>
+              <a:t>And then we finished up with some hot spot trend analysis, which really lets us quickly understand our markets where we can have the most impact.</a:t>
+            </a:r>
+          </a:p>
+          <a:p>
+            <a:endParaRPr lang="en-US" dirty="0"/>
+          </a:p>
+          <a:p>
+            <a:endParaRPr lang="en-US" dirty="0"/>
+          </a:p>
+        </p:txBody>
+      </p:sp>
+      <p:sp>
+        <p:nvSpPr>
+          <p:cNvPr id="4" name="Slide Number Placeholder 3"/>
+          <p:cNvSpPr>
+            <a:spLocks noGrp="1"/>
+          </p:cNvSpPr>
+          <p:nvPr>
+            <p:ph type="sldNum" sz="quarter" idx="5"/>
+          </p:nvPr>
+        </p:nvSpPr>
+        <p:spPr/>
+        <p:txBody>
+          <a:bodyPr/>
+          <a:lstStyle/>
+          <a:p>
+            <a:fld id="{F0907D5C-EF64-4626-B9AD-A571C980C113}" type="slidenum">
+              <a:rPr lang="en-US" smtClean="0"/>
+              <a:t>15</a:t>
+            </a:fld>
+            <a:endParaRPr lang="en-US"/>
+          </a:p>
+        </p:txBody>
+      </p:sp>
+    </p:spTree>
+    <p:extLst>
+      <p:ext uri="{BB962C8B-B14F-4D97-AF65-F5344CB8AC3E}">
+        <p14:creationId xmlns:p14="http://schemas.microsoft.com/office/powerpoint/2010/main" val="1385326261"/>
       </p:ext>
     </p:extLst>
   </p:cSld>
@@ -1232,6 +1553,115 @@
     <p:extLst>
       <p:ext uri="{BB962C8B-B14F-4D97-AF65-F5344CB8AC3E}">
         <p14:creationId xmlns:p14="http://schemas.microsoft.com/office/powerpoint/2010/main" val="1371955822"/>
+      </p:ext>
+    </p:extLst>
+  </p:cSld>
+  <p:clrMapOvr>
+    <a:masterClrMapping/>
+  </p:clrMapOvr>
+</p:notes>
+</file>
+
+<file path=ppt/notesSlides/notesSlide9.xml><?xml version="1.0" encoding="utf-8"?>
+<p:notes xmlns:a="http://schemas.openxmlformats.org/drawingml/2006/main" xmlns:r="http://schemas.openxmlformats.org/officeDocument/2006/relationships" xmlns:p="http://schemas.openxmlformats.org/presentationml/2006/main">
+  <p:cSld>
+    <p:spTree>
+      <p:nvGrpSpPr>
+        <p:cNvPr id="1" name=""/>
+        <p:cNvGrpSpPr/>
+        <p:nvPr/>
+      </p:nvGrpSpPr>
+      <p:grpSpPr>
+        <a:xfrm>
+          <a:off x="0" y="0"/>
+          <a:ext cx="0" cy="0"/>
+          <a:chOff x="0" y="0"/>
+          <a:chExt cx="0" cy="0"/>
+        </a:xfrm>
+      </p:grpSpPr>
+      <p:sp>
+        <p:nvSpPr>
+          <p:cNvPr id="2" name="Slide Image Placeholder 1"/>
+          <p:cNvSpPr>
+            <a:spLocks noGrp="1" noRot="1" noChangeAspect="1"/>
+          </p:cNvSpPr>
+          <p:nvPr>
+            <p:ph type="sldImg"/>
+          </p:nvPr>
+        </p:nvSpPr>
+        <p:spPr/>
+      </p:sp>
+      <p:sp>
+        <p:nvSpPr>
+          <p:cNvPr id="3" name="Notes Placeholder 2"/>
+          <p:cNvSpPr>
+            <a:spLocks noGrp="1"/>
+          </p:cNvSpPr>
+          <p:nvPr>
+            <p:ph type="body" idx="1"/>
+          </p:nvPr>
+        </p:nvSpPr>
+        <p:spPr/>
+        <p:txBody>
+          <a:bodyPr/>
+          <a:lstStyle/>
+          <a:p>
+            <a:r>
+              <a:rPr lang="en-US" sz="1200" b="0" i="0" kern="1200" dirty="0">
+                <a:solidFill>
+                  <a:schemeClr val="tx1"/>
+                </a:solidFill>
+                <a:effectLst/>
+                <a:latin typeface="+mn-lt"/>
+                <a:ea typeface="+mn-ea"/>
+                <a:cs typeface="+mn-cs"/>
+              </a:rPr>
+              <a:t>It appears that there is some correlation between bitterness and ABV. The data shows a trend that generally as bitterness increases, so does alcohol content. However, alcohol content may increase with or without an increase in bitterness.</a:t>
+            </a:r>
+          </a:p>
+          <a:p>
+            <a:br>
+              <a:rPr lang="en-US" sz="1200" b="0" i="0" kern="1200" dirty="0">
+                <a:solidFill>
+                  <a:schemeClr val="tx1"/>
+                </a:solidFill>
+                <a:effectLst/>
+                <a:latin typeface="+mn-lt"/>
+                <a:ea typeface="+mn-ea"/>
+                <a:cs typeface="+mn-cs"/>
+              </a:rPr>
+            </a:br>
+            <a:endParaRPr lang="en-US" dirty="0"/>
+          </a:p>
+        </p:txBody>
+      </p:sp>
+      <p:sp>
+        <p:nvSpPr>
+          <p:cNvPr id="4" name="Slide Number Placeholder 3"/>
+          <p:cNvSpPr>
+            <a:spLocks noGrp="1"/>
+          </p:cNvSpPr>
+          <p:nvPr>
+            <p:ph type="sldNum" sz="quarter" idx="5"/>
+          </p:nvPr>
+        </p:nvSpPr>
+        <p:spPr/>
+        <p:txBody>
+          <a:bodyPr/>
+          <a:lstStyle/>
+          <a:p>
+            <a:fld id="{F0907D5C-EF64-4626-B9AD-A571C980C113}" type="slidenum">
+              <a:rPr lang="en-US" smtClean="0"/>
+              <a:t>12</a:t>
+            </a:fld>
+            <a:endParaRPr lang="en-US"/>
+          </a:p>
+        </p:txBody>
+      </p:sp>
+    </p:spTree>
+    <p:extLst>
+      <p:ext uri="{BB962C8B-B14F-4D97-AF65-F5344CB8AC3E}">
+        <p14:creationId xmlns:p14="http://schemas.microsoft.com/office/powerpoint/2010/main" val="1329738736"/>
       </p:ext>
     </p:extLst>
   </p:cSld>
@@ -3784,7 +4214,7 @@
           </p:nvPr>
         </p:nvPicPr>
         <p:blipFill>
-          <a:blip r:embed="rId2"/>
+          <a:blip r:embed="rId3"/>
           <a:stretch>
             <a:fillRect/>
           </a:stretch>
@@ -3924,7 +4354,7 @@
                 <a:avLst/>
               </a:prstGeom>
               <a:blipFill>
-                <a:blip r:embed="rId3"/>
+                <a:blip r:embed="rId4"/>
                 <a:stretch>
                   <a:fillRect l="-1646" t="-825" r="-3498" b="-1650"/>
                 </a:stretch>
@@ -3959,6 +4389,289 @@
 </file>
 
 <file path=ppt/slides/slide13.xml><?xml version="1.0" encoding="utf-8"?>
+<p:sld xmlns:a="http://schemas.openxmlformats.org/drawingml/2006/main" xmlns:r="http://schemas.openxmlformats.org/officeDocument/2006/relationships" xmlns:p="http://schemas.openxmlformats.org/presentationml/2006/main">
+  <p:cSld>
+    <p:spTree>
+      <p:nvGrpSpPr>
+        <p:cNvPr id="1" name=""/>
+        <p:cNvGrpSpPr/>
+        <p:nvPr/>
+      </p:nvGrpSpPr>
+      <p:grpSpPr>
+        <a:xfrm>
+          <a:off x="0" y="0"/>
+          <a:ext cx="0" cy="0"/>
+          <a:chOff x="0" y="0"/>
+          <a:chExt cx="0" cy="0"/>
+        </a:xfrm>
+      </p:grpSpPr>
+      <p:sp>
+        <p:nvSpPr>
+          <p:cNvPr id="2" name="Title 1">
+            <a:extLst>
+              <a:ext uri="{FF2B5EF4-FFF2-40B4-BE49-F238E27FC236}">
+                <a16:creationId xmlns:a16="http://schemas.microsoft.com/office/drawing/2014/main" id="{868A9893-C7EF-4885-BE10-FF19286603C4}"/>
+              </a:ext>
+            </a:extLst>
+          </p:cNvPr>
+          <p:cNvSpPr>
+            <a:spLocks noGrp="1"/>
+          </p:cNvSpPr>
+          <p:nvPr>
+            <p:ph type="title"/>
+          </p:nvPr>
+        </p:nvSpPr>
+        <p:spPr/>
+        <p:txBody>
+          <a:bodyPr/>
+          <a:lstStyle/>
+          <a:p>
+            <a:r>
+              <a:rPr lang="en-US" dirty="0"/>
+              <a:t>Beer Scene Varieties</a:t>
+            </a:r>
+          </a:p>
+        </p:txBody>
+      </p:sp>
+      <p:pic>
+        <p:nvPicPr>
+          <p:cNvPr id="5" name="Content Placeholder 4">
+            <a:extLst>
+              <a:ext uri="{FF2B5EF4-FFF2-40B4-BE49-F238E27FC236}">
+                <a16:creationId xmlns:a16="http://schemas.microsoft.com/office/drawing/2014/main" id="{7C1F1DE3-298B-40ED-8110-5A27C4008D6F}"/>
+              </a:ext>
+            </a:extLst>
+          </p:cNvPr>
+          <p:cNvPicPr>
+            <a:picLocks noGrp="1" noChangeAspect="1"/>
+          </p:cNvPicPr>
+          <p:nvPr>
+            <p:ph idx="1"/>
+          </p:nvPr>
+        </p:nvPicPr>
+        <p:blipFill>
+          <a:blip r:embed="rId3"/>
+          <a:stretch>
+            <a:fillRect/>
+          </a:stretch>
+        </p:blipFill>
+        <p:spPr>
+          <a:xfrm>
+            <a:off x="465275" y="1600200"/>
+            <a:ext cx="8213450" cy="4525963"/>
+          </a:xfrm>
+          <a:prstGeom prst="rect">
+            <a:avLst/>
+          </a:prstGeom>
+        </p:spPr>
+      </p:pic>
+    </p:spTree>
+    <p:extLst>
+      <p:ext uri="{BB962C8B-B14F-4D97-AF65-F5344CB8AC3E}">
+        <p14:creationId xmlns:p14="http://schemas.microsoft.com/office/powerpoint/2010/main" val="1560346456"/>
+      </p:ext>
+    </p:extLst>
+  </p:cSld>
+  <p:clrMapOvr>
+    <a:masterClrMapping/>
+  </p:clrMapOvr>
+</p:sld>
+</file>
+
+<file path=ppt/slides/slide14.xml><?xml version="1.0" encoding="utf-8"?>
+<p:sld xmlns:a="http://schemas.openxmlformats.org/drawingml/2006/main" xmlns:r="http://schemas.openxmlformats.org/officeDocument/2006/relationships" xmlns:p="http://schemas.openxmlformats.org/presentationml/2006/main">
+  <p:cSld>
+    <p:spTree>
+      <p:nvGrpSpPr>
+        <p:cNvPr id="1" name=""/>
+        <p:cNvGrpSpPr/>
+        <p:nvPr/>
+      </p:nvGrpSpPr>
+      <p:grpSpPr>
+        <a:xfrm>
+          <a:off x="0" y="0"/>
+          <a:ext cx="0" cy="0"/>
+          <a:chOff x="0" y="0"/>
+          <a:chExt cx="0" cy="0"/>
+        </a:xfrm>
+      </p:grpSpPr>
+      <p:pic>
+        <p:nvPicPr>
+          <p:cNvPr id="6" name="Content Placeholder 5">
+            <a:extLst>
+              <a:ext uri="{FF2B5EF4-FFF2-40B4-BE49-F238E27FC236}">
+                <a16:creationId xmlns:a16="http://schemas.microsoft.com/office/drawing/2014/main" id="{139C9B5A-2EC1-4EC0-A5CC-C961D6A7F965}"/>
+              </a:ext>
+            </a:extLst>
+          </p:cNvPr>
+          <p:cNvPicPr>
+            <a:picLocks noGrp="1" noChangeAspect="1"/>
+          </p:cNvPicPr>
+          <p:nvPr>
+            <p:ph idx="1"/>
+          </p:nvPr>
+        </p:nvPicPr>
+        <p:blipFill>
+          <a:blip r:embed="rId3"/>
+          <a:stretch>
+            <a:fillRect/>
+          </a:stretch>
+        </p:blipFill>
+        <p:spPr>
+          <a:prstGeom prst="rect">
+            <a:avLst/>
+          </a:prstGeom>
+        </p:spPr>
+      </p:pic>
+      <p:sp>
+        <p:nvSpPr>
+          <p:cNvPr id="2" name="Title 1">
+            <a:extLst>
+              <a:ext uri="{FF2B5EF4-FFF2-40B4-BE49-F238E27FC236}">
+                <a16:creationId xmlns:a16="http://schemas.microsoft.com/office/drawing/2014/main" id="{868A9893-C7EF-4885-BE10-FF19286603C4}"/>
+              </a:ext>
+            </a:extLst>
+          </p:cNvPr>
+          <p:cNvSpPr>
+            <a:spLocks noGrp="1"/>
+          </p:cNvSpPr>
+          <p:nvPr>
+            <p:ph type="title"/>
+          </p:nvPr>
+        </p:nvSpPr>
+        <p:spPr/>
+        <p:txBody>
+          <a:bodyPr/>
+          <a:lstStyle/>
+          <a:p>
+            <a:r>
+              <a:rPr lang="en-US" dirty="0"/>
+              <a:t>Beer Taste Varieties</a:t>
+            </a:r>
+          </a:p>
+        </p:txBody>
+      </p:sp>
+    </p:spTree>
+    <p:extLst>
+      <p:ext uri="{BB962C8B-B14F-4D97-AF65-F5344CB8AC3E}">
+        <p14:creationId xmlns:p14="http://schemas.microsoft.com/office/powerpoint/2010/main" val="1878071260"/>
+      </p:ext>
+    </p:extLst>
+  </p:cSld>
+  <p:clrMapOvr>
+    <a:masterClrMapping/>
+  </p:clrMapOvr>
+</p:sld>
+</file>
+
+<file path=ppt/slides/slide15.xml><?xml version="1.0" encoding="utf-8"?>
+<p:sld xmlns:a="http://schemas.openxmlformats.org/drawingml/2006/main" xmlns:r="http://schemas.openxmlformats.org/officeDocument/2006/relationships" xmlns:p="http://schemas.openxmlformats.org/presentationml/2006/main">
+  <p:cSld>
+    <p:spTree>
+      <p:nvGrpSpPr>
+        <p:cNvPr id="1" name=""/>
+        <p:cNvGrpSpPr/>
+        <p:nvPr/>
+      </p:nvGrpSpPr>
+      <p:grpSpPr>
+        <a:xfrm>
+          <a:off x="0" y="0"/>
+          <a:ext cx="0" cy="0"/>
+          <a:chOff x="0" y="0"/>
+          <a:chExt cx="0" cy="0"/>
+        </a:xfrm>
+      </p:grpSpPr>
+      <p:sp>
+        <p:nvSpPr>
+          <p:cNvPr id="2" name="Title 1">
+            <a:extLst>
+              <a:ext uri="{FF2B5EF4-FFF2-40B4-BE49-F238E27FC236}">
+                <a16:creationId xmlns:a16="http://schemas.microsoft.com/office/drawing/2014/main" id="{868A9893-C7EF-4885-BE10-FF19286603C4}"/>
+              </a:ext>
+            </a:extLst>
+          </p:cNvPr>
+          <p:cNvSpPr>
+            <a:spLocks noGrp="1"/>
+          </p:cNvSpPr>
+          <p:nvPr>
+            <p:ph type="title"/>
+          </p:nvPr>
+        </p:nvSpPr>
+        <p:spPr/>
+        <p:txBody>
+          <a:bodyPr/>
+          <a:lstStyle/>
+          <a:p>
+            <a:r>
+              <a:rPr lang="en-US" dirty="0"/>
+              <a:t>Last Call</a:t>
+            </a:r>
+          </a:p>
+        </p:txBody>
+      </p:sp>
+      <p:sp>
+        <p:nvSpPr>
+          <p:cNvPr id="4" name="Content Placeholder 3">
+            <a:extLst>
+              <a:ext uri="{FF2B5EF4-FFF2-40B4-BE49-F238E27FC236}">
+                <a16:creationId xmlns:a16="http://schemas.microsoft.com/office/drawing/2014/main" id="{D143FA12-181B-450D-9C5C-519DB8C9D0CD}"/>
+              </a:ext>
+            </a:extLst>
+          </p:cNvPr>
+          <p:cNvSpPr>
+            <a:spLocks noGrp="1"/>
+          </p:cNvSpPr>
+          <p:nvPr>
+            <p:ph idx="1"/>
+          </p:nvPr>
+        </p:nvSpPr>
+        <p:spPr/>
+        <p:txBody>
+          <a:bodyPr/>
+          <a:lstStyle/>
+          <a:p>
+            <a:r>
+              <a:rPr lang="en-US" sz="2800" dirty="0"/>
+              <a:t>Maine has the highest ABV and IBU ratings</a:t>
+            </a:r>
+          </a:p>
+          <a:p>
+            <a:r>
+              <a:rPr lang="en-US" sz="2800" dirty="0"/>
+              <a:t>Colorado has very high ratings for brewery and beer selection</a:t>
+            </a:r>
+          </a:p>
+          <a:p>
+            <a:r>
+              <a:rPr lang="en-US" sz="2800" dirty="0"/>
+              <a:t>Bitterness of beer affects ABV</a:t>
+            </a:r>
+          </a:p>
+          <a:p>
+            <a:r>
+              <a:rPr lang="en-US" sz="2800" dirty="0"/>
+              <a:t>Machine Learning models can assist with missing data and classification of beer types</a:t>
+            </a:r>
+          </a:p>
+          <a:p>
+            <a:endParaRPr lang="en-US" sz="2800" dirty="0"/>
+          </a:p>
+        </p:txBody>
+      </p:sp>
+    </p:spTree>
+    <p:extLst>
+      <p:ext uri="{BB962C8B-B14F-4D97-AF65-F5344CB8AC3E}">
+        <p14:creationId xmlns:p14="http://schemas.microsoft.com/office/powerpoint/2010/main" val="2838604011"/>
+      </p:ext>
+    </p:extLst>
+  </p:cSld>
+  <p:clrMapOvr>
+    <a:masterClrMapping/>
+  </p:clrMapOvr>
+</p:sld>
+</file>
+
+<file path=ppt/slides/slide16.xml><?xml version="1.0" encoding="utf-8"?>
 <p:sld xmlns:a="http://schemas.openxmlformats.org/drawingml/2006/main" xmlns:r="http://schemas.openxmlformats.org/officeDocument/2006/relationships" xmlns:p="http://schemas.openxmlformats.org/presentationml/2006/main">
   <p:cSld>
     <p:spTree>
@@ -12447,10 +13160,10 @@
       </p:sp>
       <p:pic>
         <p:nvPicPr>
-          <p:cNvPr id="9" name="Picture 8">
+          <p:cNvPr id="5" name="Picture 4">
             <a:extLst>
               <a:ext uri="{FF2B5EF4-FFF2-40B4-BE49-F238E27FC236}">
-                <a16:creationId xmlns:a16="http://schemas.microsoft.com/office/drawing/2014/main" id="{01C4BF11-5E24-400D-9A87-FAC22A060EFA}"/>
+                <a16:creationId xmlns:a16="http://schemas.microsoft.com/office/drawing/2014/main" id="{2B745E21-03B1-485A-9AA1-56BD6E463992}"/>
               </a:ext>
             </a:extLst>
           </p:cNvPr>
@@ -12467,8 +13180,8 @@
         </p:blipFill>
         <p:spPr>
           <a:xfrm>
-            <a:off x="0" y="1371600"/>
-            <a:ext cx="9144000" cy="4704886"/>
+            <a:off x="1204912" y="1586326"/>
+            <a:ext cx="6734175" cy="4619625"/>
           </a:xfrm>
           <a:prstGeom prst="rect">
             <a:avLst/>
@@ -12505,38 +13218,6 @@
           <a:chExt cx="0" cy="0"/>
         </a:xfrm>
       </p:grpSpPr>
-      <p:pic>
-        <p:nvPicPr>
-          <p:cNvPr id="14" name="Content Placeholder 13">
-            <a:extLst>
-              <a:ext uri="{FF2B5EF4-FFF2-40B4-BE49-F238E27FC236}">
-                <a16:creationId xmlns:a16="http://schemas.microsoft.com/office/drawing/2014/main" id="{A2643DE2-35EF-42D1-9C30-2453B1DE81AE}"/>
-              </a:ext>
-            </a:extLst>
-          </p:cNvPr>
-          <p:cNvPicPr>
-            <a:picLocks noGrp="1" noChangeAspect="1"/>
-          </p:cNvPicPr>
-          <p:nvPr>
-            <p:ph idx="1"/>
-          </p:nvPr>
-        </p:nvPicPr>
-        <p:blipFill>
-          <a:blip r:embed="rId3"/>
-          <a:stretch>
-            <a:fillRect/>
-          </a:stretch>
-        </p:blipFill>
-        <p:spPr>
-          <a:xfrm>
-            <a:off x="208722" y="1499452"/>
-            <a:ext cx="8790688" cy="4762200"/>
-          </a:xfrm>
-          <a:prstGeom prst="rect">
-            <a:avLst/>
-          </a:prstGeom>
-        </p:spPr>
-      </p:pic>
       <p:sp>
         <p:nvSpPr>
           <p:cNvPr id="2" name="Title 1">
@@ -12565,6 +13246,38 @@
           </a:p>
         </p:txBody>
       </p:sp>
+      <p:pic>
+        <p:nvPicPr>
+          <p:cNvPr id="5" name="Content Placeholder 4">
+            <a:extLst>
+              <a:ext uri="{FF2B5EF4-FFF2-40B4-BE49-F238E27FC236}">
+                <a16:creationId xmlns:a16="http://schemas.microsoft.com/office/drawing/2014/main" id="{6D090059-9C5D-4CBB-A1CA-0D7B8C3A0A17}"/>
+              </a:ext>
+            </a:extLst>
+          </p:cNvPr>
+          <p:cNvPicPr>
+            <a:picLocks noGrp="1" noChangeAspect="1"/>
+          </p:cNvPicPr>
+          <p:nvPr>
+            <p:ph idx="1"/>
+          </p:nvPr>
+        </p:nvPicPr>
+        <p:blipFill>
+          <a:blip r:embed="rId3"/>
+          <a:stretch>
+            <a:fillRect/>
+          </a:stretch>
+        </p:blipFill>
+        <p:spPr>
+          <a:xfrm>
+            <a:off x="1333837" y="1600200"/>
+            <a:ext cx="6476326" cy="4525963"/>
+          </a:xfrm>
+          <a:prstGeom prst="rect">
+            <a:avLst/>
+          </a:prstGeom>
+        </p:spPr>
+      </p:pic>
       <p:sp>
         <p:nvSpPr>
           <p:cNvPr id="9" name="Multiplication Sign 8">
@@ -12579,7 +13292,7 @@
         </p:nvSpPr>
         <p:spPr>
           <a:xfrm>
-            <a:off x="4412974" y="2550742"/>
+            <a:off x="4572000" y="2749525"/>
             <a:ext cx="5387009" cy="4591878"/>
           </a:xfrm>
           <a:prstGeom prst="mathMultiply">
@@ -12625,7 +13338,7 @@
         </p:nvCxnSpPr>
         <p:spPr>
           <a:xfrm>
-            <a:off x="159026" y="3478695"/>
+            <a:off x="1639957" y="3428999"/>
             <a:ext cx="1232452" cy="0"/>
           </a:xfrm>
           <a:prstGeom prst="straightConnector1">

</xml_diff>

<commit_message>
added link to Dustin's pptx
</commit_message>
<xml_diff>
--- a/EDA.pptx
+++ b/EDA.pptx
@@ -4654,7 +4654,18 @@
             </a:r>
           </a:p>
           <a:p>
+            <a:r>
+              <a:rPr lang="en-US" sz="2800"/>
+              <a:t>Video links</a:t>
+            </a:r>
             <a:endParaRPr lang="en-US" sz="2800" dirty="0"/>
+          </a:p>
+          <a:p>
+            <a:pPr lvl="1"/>
+            <a:r>
+              <a:rPr lang="en-US" sz="2400" dirty="0"/>
+              <a:t>Dustin: https://youtu.be/_yqs3Q68Btc</a:t>
+            </a:r>
           </a:p>
         </p:txBody>
       </p:sp>

</xml_diff>